<commit_message>
phi: update 3 tutorials
</commit_message>
<xml_diff>
--- a/raspWS.pptx
+++ b/raspWS.pptx
@@ -312,7 +312,7 @@
             <a:fld id="{B61BEF0D-F0BB-DE4B-95CE-6DB70DBA9567}" type="datetimeFigureOut">
               <a:rPr lang="en-US" dirty="0"/>
               <a:pPr/>
-              <a:t>12/29/2016</a:t>
+              <a:t>12/30/2016</a:t>
             </a:fld>
             <a:endParaRPr lang="en-US" dirty="0"/>
           </a:p>
@@ -647,7 +647,7 @@
             <a:fld id="{B61BEF0D-F0BB-DE4B-95CE-6DB70DBA9567}" type="datetimeFigureOut">
               <a:rPr lang="en-US" dirty="0"/>
               <a:pPr/>
-              <a:t>12/29/2016</a:t>
+              <a:t>12/30/2016</a:t>
             </a:fld>
             <a:endParaRPr lang="en-US" dirty="0"/>
           </a:p>
@@ -1045,7 +1045,7 @@
             <a:fld id="{B61BEF0D-F0BB-DE4B-95CE-6DB70DBA9567}" type="datetimeFigureOut">
               <a:rPr lang="en-US" dirty="0"/>
               <a:pPr/>
-              <a:t>12/29/2016</a:t>
+              <a:t>12/30/2016</a:t>
             </a:fld>
             <a:endParaRPr lang="en-US" dirty="0"/>
           </a:p>
@@ -1378,7 +1378,7 @@
             <a:fld id="{B61BEF0D-F0BB-DE4B-95CE-6DB70DBA9567}" type="datetimeFigureOut">
               <a:rPr lang="en-US" dirty="0"/>
               <a:pPr/>
-              <a:t>12/29/2016</a:t>
+              <a:t>12/30/2016</a:t>
             </a:fld>
             <a:endParaRPr lang="en-US" dirty="0"/>
           </a:p>
@@ -1695,7 +1695,7 @@
             <a:fld id="{B61BEF0D-F0BB-DE4B-95CE-6DB70DBA9567}" type="datetimeFigureOut">
               <a:rPr lang="en-US" dirty="0"/>
               <a:pPr/>
-              <a:t>12/29/2016</a:t>
+              <a:t>12/30/2016</a:t>
             </a:fld>
             <a:endParaRPr lang="en-US" dirty="0"/>
           </a:p>
@@ -2088,7 +2088,7 @@
             <a:fld id="{B61BEF0D-F0BB-DE4B-95CE-6DB70DBA9567}" type="datetimeFigureOut">
               <a:rPr lang="en-US" dirty="0"/>
               <a:pPr/>
-              <a:t>12/29/2016</a:t>
+              <a:t>12/30/2016</a:t>
             </a:fld>
             <a:endParaRPr lang="en-US" dirty="0"/>
           </a:p>
@@ -2342,7 +2342,7 @@
             <a:fld id="{B61BEF0D-F0BB-DE4B-95CE-6DB70DBA9567}" type="datetimeFigureOut">
               <a:rPr lang="en-US" dirty="0"/>
               <a:pPr/>
-              <a:t>12/29/2016</a:t>
+              <a:t>12/30/2016</a:t>
             </a:fld>
             <a:endParaRPr lang="en-US" dirty="0"/>
           </a:p>
@@ -2601,7 +2601,7 @@
             <a:fld id="{B61BEF0D-F0BB-DE4B-95CE-6DB70DBA9567}" type="datetimeFigureOut">
               <a:rPr lang="en-US" dirty="0"/>
               <a:pPr/>
-              <a:t>12/29/2016</a:t>
+              <a:t>12/30/2016</a:t>
             </a:fld>
             <a:endParaRPr lang="en-US" dirty="0"/>
           </a:p>
@@ -2860,7 +2860,7 @@
             <a:fld id="{B61BEF0D-F0BB-DE4B-95CE-6DB70DBA9567}" type="datetimeFigureOut">
               <a:rPr lang="en-US" dirty="0"/>
               <a:pPr/>
-              <a:t>12/29/2016</a:t>
+              <a:t>12/30/2016</a:t>
             </a:fld>
             <a:endParaRPr lang="en-US" dirty="0"/>
           </a:p>
@@ -3186,7 +3186,7 @@
             <a:fld id="{B61BEF0D-F0BB-DE4B-95CE-6DB70DBA9567}" type="datetimeFigureOut">
               <a:rPr lang="en-US" dirty="0"/>
               <a:pPr/>
-              <a:t>12/29/2016</a:t>
+              <a:t>12/30/2016</a:t>
             </a:fld>
             <a:endParaRPr lang="en-US" dirty="0"/>
           </a:p>
@@ -3506,7 +3506,7 @@
             <a:fld id="{B61BEF0D-F0BB-DE4B-95CE-6DB70DBA9567}" type="datetimeFigureOut">
               <a:rPr lang="en-US" dirty="0"/>
               <a:pPr/>
-              <a:t>12/29/2016</a:t>
+              <a:t>12/30/2016</a:t>
             </a:fld>
             <a:endParaRPr lang="en-US" dirty="0"/>
           </a:p>
@@ -3960,7 +3960,7 @@
             <a:fld id="{B61BEF0D-F0BB-DE4B-95CE-6DB70DBA9567}" type="datetimeFigureOut">
               <a:rPr lang="en-US" dirty="0"/>
               <a:pPr/>
-              <a:t>12/29/2016</a:t>
+              <a:t>12/30/2016</a:t>
             </a:fld>
             <a:endParaRPr lang="en-US" dirty="0"/>
           </a:p>
@@ -4162,7 +4162,7 @@
             <a:fld id="{B61BEF0D-F0BB-DE4B-95CE-6DB70DBA9567}" type="datetimeFigureOut">
               <a:rPr lang="en-US" dirty="0"/>
               <a:pPr/>
-              <a:t>12/29/2016</a:t>
+              <a:t>12/30/2016</a:t>
             </a:fld>
             <a:endParaRPr lang="en-US" dirty="0"/>
           </a:p>
@@ -4336,7 +4336,7 @@
             <a:fld id="{B61BEF0D-F0BB-DE4B-95CE-6DB70DBA9567}" type="datetimeFigureOut">
               <a:rPr lang="en-US" dirty="0"/>
               <a:pPr/>
-              <a:t>12/29/2016</a:t>
+              <a:t>12/30/2016</a:t>
             </a:fld>
             <a:endParaRPr lang="en-US" dirty="0"/>
           </a:p>
@@ -4666,7 +4666,7 @@
             <a:fld id="{B61BEF0D-F0BB-DE4B-95CE-6DB70DBA9567}" type="datetimeFigureOut">
               <a:rPr lang="en-US" dirty="0"/>
               <a:pPr/>
-              <a:t>12/29/2016</a:t>
+              <a:t>12/30/2016</a:t>
             </a:fld>
             <a:endParaRPr lang="en-US" dirty="0"/>
           </a:p>
@@ -5008,7 +5008,7 @@
             <a:fld id="{B61BEF0D-F0BB-DE4B-95CE-6DB70DBA9567}" type="datetimeFigureOut">
               <a:rPr lang="en-US" dirty="0"/>
               <a:pPr/>
-              <a:t>12/29/2016</a:t>
+              <a:t>12/30/2016</a:t>
             </a:fld>
             <a:endParaRPr lang="en-US" dirty="0"/>
           </a:p>
@@ -7122,7 +7122,7 @@
             <a:fld id="{B61BEF0D-F0BB-DE4B-95CE-6DB70DBA9567}" type="datetimeFigureOut">
               <a:rPr lang="en-US" dirty="0"/>
               <a:pPr/>
-              <a:t>12/29/2016</a:t>
+              <a:t>12/30/2016</a:t>
             </a:fld>
             <a:endParaRPr lang="en-US" dirty="0"/>
           </a:p>
@@ -10510,10 +10510,10 @@
           <a:lstStyle/>
           <a:p>
             <a:r>
-              <a:rPr lang="en-US"/>
-              <a:t>GPIO: Tutorial 2: take a picture </a:t>
-            </a:r>
-            <a:endParaRPr lang="en-GB"/>
+              <a:rPr lang="en-US" dirty="0"/>
+              <a:t>Tutorial 2: take a picture </a:t>
+            </a:r>
+            <a:endParaRPr lang="en-GB" dirty="0"/>
           </a:p>
         </p:txBody>
       </p:sp>
@@ -12535,6 +12535,30 @@
           </a:p>
         </p:txBody>
       </p:sp>
+      <p:pic>
+        <p:nvPicPr>
+          <p:cNvPr id="4" name="Picture 3"/>
+          <p:cNvPicPr>
+            <a:picLocks noChangeAspect="1"/>
+          </p:cNvPicPr>
+          <p:nvPr/>
+        </p:nvPicPr>
+        <p:blipFill>
+          <a:blip r:embed="rId2"/>
+          <a:stretch>
+            <a:fillRect/>
+          </a:stretch>
+        </p:blipFill>
+        <p:spPr>
+          <a:xfrm>
+            <a:off x="5486400" y="1262129"/>
+            <a:ext cx="6567058" cy="3915177"/>
+          </a:xfrm>
+          <a:prstGeom prst="rect">
+            <a:avLst/>
+          </a:prstGeom>
+        </p:spPr>
+      </p:pic>
     </p:spTree>
     <p:extLst>
       <p:ext uri="{BB962C8B-B14F-4D97-AF65-F5344CB8AC3E}">

</xml_diff>